<commit_message>
Adding perception data comparison.
</commit_message>
<xml_diff>
--- a/consumption/presentation_chapter3_1.pptx
+++ b/consumption/presentation_chapter3_1.pptx
@@ -3405,7 +3405,7 @@
           <a:p>
             <a:r>
               <a:rPr lang="en-US" dirty="0"/>
-              <a:t>A Stochastic utility view  of Status Consumption</a:t>
+              <a:t>A Stochastic utility view of Status Consumption</a:t>
             </a:r>
             <a:endParaRPr lang="en-GB" dirty="0"/>
           </a:p>
@@ -3489,7 +3489,7 @@
         <p:spPr/>
         <p:txBody>
           <a:bodyPr>
-            <a:normAutofit fontScale="92500" lnSpcReduction="10000"/>
+            <a:normAutofit fontScale="92500" lnSpcReduction="20000"/>
           </a:bodyPr>
           <a:lstStyle/>
           <a:p>
@@ -3501,7 +3501,13 @@
           <a:p>
             <a:r>
               <a:rPr lang="en-US" dirty="0"/>
-              <a:t>The definition requires necessities to be not subjective (or else there would no status consumption) but how do we determine status goods?</a:t>
+              <a:t>Necessities cannot be subjective in this view (or else there would no status consumption) </a:t>
+            </a:r>
+          </a:p>
+          <a:p>
+            <a:r>
+              <a:rPr lang="en-US" dirty="0"/>
+              <a:t>But how do we determine status goods?</a:t>
             </a:r>
           </a:p>
           <a:p>
@@ -3552,7 +3558,7 @@
             </a:r>
             <a:r>
               <a:rPr lang="en-US" dirty="0"/>
-              <a:t> use fur coat, cuff links, caviar as high-status products while low-status products vacuum cleaner, sofa, refrigerator, washing machine, and an unbranded shirt</a:t>
+              <a:t> use fur coat, cuff links, caviar as high-status products while low-status products are vacuum cleaner, sofa, refrigerator, washing machine, and an unbranded shirt</a:t>
             </a:r>
           </a:p>
           <a:p>
@@ -3643,7 +3649,7 @@
         <p:spPr/>
         <p:txBody>
           <a:bodyPr>
-            <a:normAutofit fontScale="92500" lnSpcReduction="20000"/>
+            <a:normAutofit fontScale="85000" lnSpcReduction="10000"/>
           </a:bodyPr>
           <a:lstStyle/>
           <a:p>
@@ -3656,14 +3662,14 @@
             <a:pPr lvl="1"/>
             <a:r>
               <a:rPr lang="en-US" dirty="0"/>
-              <a:t>Observing historically restricted ownership of vehicles by social groups and then testing for high proportion of expenditure on vehicles (African Americans in the US)</a:t>
+              <a:t>Observing historically restricted ownership of vehicles by social groups and then testing for high proportion of expenditure on vehicles etc. (African Americans in the US)</a:t>
             </a:r>
           </a:p>
           <a:p>
             <a:pPr lvl="1"/>
             <a:r>
               <a:rPr lang="en-US" dirty="0"/>
-              <a:t>Observing restrictions on conspicuous goods in collective governments and then testing for higher expenditure on conspicuous goods after the collectivism has ended (East Germany)</a:t>
+              <a:t>Observing restrictions on conspicuous goods in collective governments and then testing for higher expenditure on conspicuous goods after the end of collectivism(East Germany)</a:t>
             </a:r>
           </a:p>
           <a:p>
@@ -3676,7 +3682,7 @@
           <a:p>
             <a:r>
               <a:rPr lang="en-GB" dirty="0"/>
-              <a:t>Apart from the varied social contexts for classification of items, a serious issue with the above approach is that in name of status consumption one is limited to observing a bandwagon effect spread over a few generations. That artificially suppressed demands rise after the barriers have been lifted does not say much about the utility of status goods</a:t>
+              <a:t>Apart from the varied social contexts for classification of items, a serious issue with the above approach is that in name of status consumption one is limited to observing a bandwagon effect spread over a few generations. That artificially suppressed demands rise after the barriers have been lifted does not say much about the utility of status goods.</a:t>
             </a:r>
           </a:p>
         </p:txBody>
@@ -3803,7 +3809,6 @@
                   <a:srgbClr val="1A1A1A"/>
                 </a:solidFill>
                 <a:effectLst/>
-                <a:latin typeface="Times New Roman" panose="02020603050405020304" pitchFamily="18" charset="0"/>
               </a:rPr>
               <a:t>active manipulation of signs”– the mechanism to insert oneself within the consumer society (and working to differentiate oneself from others) is itself a form of </a:t>
             </a:r>
@@ -3813,7 +3818,6 @@
                   <a:srgbClr val="1A1A1A"/>
                 </a:solidFill>
                 <a:effectLst/>
-                <a:latin typeface="Times New Roman" panose="02020603050405020304" pitchFamily="18" charset="0"/>
               </a:rPr>
               <a:t>labour</a:t>
             </a:r>
@@ -3822,7 +3826,6 @@
                 <a:srgbClr val="1A1A1A"/>
               </a:solidFill>
               <a:effectLst/>
-              <a:latin typeface="Times New Roman" panose="02020603050405020304" pitchFamily="18" charset="0"/>
             </a:endParaRPr>
           </a:p>
           <a:p>
@@ -3918,7 +3921,7 @@
         <p:spPr/>
         <p:txBody>
           <a:bodyPr>
-            <a:normAutofit fontScale="85000" lnSpcReduction="10000"/>
+            <a:normAutofit fontScale="85000" lnSpcReduction="20000"/>
           </a:bodyPr>
           <a:lstStyle/>
           <a:p>
@@ -3978,7 +3981,13 @@
           <a:p>
             <a:r>
               <a:rPr lang="en-US" dirty="0"/>
-              <a:t>We argue therefore that </a:t>
+              <a:t>The above opposing directions balance the right amount of status consumption</a:t>
+            </a:r>
+          </a:p>
+          <a:p>
+            <a:r>
+              <a:rPr lang="en-US" dirty="0"/>
+              <a:t>We argue that </a:t>
             </a:r>
           </a:p>
           <a:p>
@@ -3987,8 +3996,12 @@
               <a:buAutoNum type="arabicPeriod"/>
             </a:pPr>
             <a:r>
+              <a:rPr lang="en-US" b="1" dirty="0"/>
+              <a:t>Wealth </a:t>
+            </a:r>
+            <a:r>
               <a:rPr lang="en-US" dirty="0"/>
-              <a:t>Wealth goals are better represented with utility under risk </a:t>
+              <a:t>goals are better represented with utility under risk </a:t>
             </a:r>
           </a:p>
           <a:p>
@@ -3998,7 +4011,15 @@
             </a:pPr>
             <a:r>
               <a:rPr lang="en-US" dirty="0"/>
-              <a:t>The feelings of permanence/security are better understood in a framework of dynamic reference points (see </a:t>
+              <a:t>The feelings of </a:t>
+            </a:r>
+            <a:r>
+              <a:rPr lang="en-US" b="1" dirty="0"/>
+              <a:t>permanence</a:t>
+            </a:r>
+            <a:r>
+              <a:rPr lang="en-US" dirty="0"/>
+              <a:t>/security are better understood in a framework of dynamic reference points (see </a:t>
             </a:r>
             <a:r>
               <a:rPr lang="en-US" dirty="0" err="1"/>
@@ -4105,25 +4126,25 @@
         <p:spPr/>
         <p:txBody>
           <a:bodyPr>
-            <a:normAutofit fontScale="92500" lnSpcReduction="20000"/>
+            <a:normAutofit fontScale="85000" lnSpcReduction="10000"/>
           </a:bodyPr>
           <a:lstStyle/>
           <a:p>
             <a:r>
               <a:rPr lang="en-US" dirty="0"/>
-              <a:t>The investments in development social networks or splurge in social events – which are clearly instances of status consumption - do not provide a deterministic material advantage. Therefore we associated a probability function with the future wealth points to represent the consumer’s subjective future goal in the competition for wealth and permanence</a:t>
+              <a:t>The investments in development of social networks or splurge in social events – which are clearly instances of status consumption - do not provide a deterministic material advantage. Therefore, we associate a probability function with the future wealth points to represent the consumer’s subjective future goal in the competition for wealth and permanence</a:t>
             </a:r>
           </a:p>
           <a:p>
             <a:r>
               <a:rPr lang="en-US" dirty="0"/>
-              <a:t>The consumer’s risk –aversion has therefore a direct influence on her destiny in an environment of uncertainty. </a:t>
+              <a:t>As far as the maximization of expected wealth is concerned, the consumer’s risk-aversion has a direct influence on her destiny in the environment of uncertainty </a:t>
             </a:r>
           </a:p>
           <a:p>
             <a:r>
               <a:rPr lang="en-US" dirty="0"/>
-              <a:t>More particularly, through acquiring habits, taste and identity that develop around status items, the consumer obtains a subjective security (or a boost in self-image) that makes her believe that she would not drift into an </a:t>
+              <a:t>Through acquiring habits, taste and identity that develop around status items, the consumer also obtains a subjective security (or a boost in self-image) that makes her believe that she would not drift into an </a:t>
             </a:r>
             <a:r>
               <a:rPr lang="en-US" dirty="0" err="1"/>
@@ -4138,7 +4159,7 @@
           <a:p>
             <a:r>
               <a:rPr lang="en-US" dirty="0"/>
-              <a:t>We extend this view of status using insights from Prospect Theory and the framework for dynamic reference in decision under risk</a:t>
+              <a:t>We use both Prospect Theory and a framework for dynamic references to develop the model for a competition for wealth and permanence</a:t>
             </a:r>
             <a:endParaRPr lang="en-GB" dirty="0"/>
           </a:p>
@@ -4200,7 +4221,7 @@
           <a:p>
             <a:r>
               <a:rPr lang="en-US" dirty="0"/>
-              <a:t>Comparison with empirical approaches</a:t>
+              <a:t>Comparison with past empirical approaches</a:t>
             </a:r>
             <a:endParaRPr lang="en-GB" dirty="0"/>
           </a:p>
@@ -4224,16 +4245,21 @@
                 <p:ph idx="1"/>
               </p:nvPr>
             </p:nvSpPr>
-            <p:spPr/>
+            <p:spPr>
+              <a:xfrm>
+                <a:off x="846589" y="1825625"/>
+                <a:ext cx="10515600" cy="4351338"/>
+              </a:xfrm>
+            </p:spPr>
             <p:txBody>
               <a:bodyPr>
-                <a:normAutofit fontScale="92500" lnSpcReduction="10000"/>
+                <a:normAutofit fontScale="70000" lnSpcReduction="20000"/>
               </a:bodyPr>
               <a:lstStyle/>
               <a:p>
                 <a:r>
                   <a:rPr lang="en-US" dirty="0"/>
-                  <a:t>In Chapter 2 we consider a model where consumers compete for status under wealth difference with both long-term durable good </a:t>
+                  <a:t>In Chapter 2 we considered a model where consumers compete for status under wealth difference with both long-term durable good </a:t>
                 </a:r>
                 <a14:m>
                   <m:oMath xmlns:m="http://schemas.openxmlformats.org/officeDocument/2006/math">
@@ -4259,10 +4285,13 @@
                     </m:r>
                   </m:oMath>
                 </a14:m>
-                <a:r>
-                  <a:rPr lang="en-US" dirty="0"/>
-                  <a:t> – where the former (</a:t>
-                </a:r>
+                <a:endParaRPr lang="en-US" dirty="0"/>
+              </a:p>
+              <a:p>
+                <a:pPr marL="914400" lvl="1" indent="-457200">
+                  <a:buFont typeface="+mj-lt"/>
+                  <a:buAutoNum type="arabicPeriod"/>
+                </a:pPr>
                 <a14:m>
                   <m:oMath xmlns:m="http://schemas.openxmlformats.org/officeDocument/2006/math">
                     <m:r>
@@ -4275,7 +4304,7 @@
                 </a14:m>
                 <a:r>
                   <a:rPr lang="en-US" dirty="0"/>
-                  <a:t>) directly contributes to one’s wealth and the excess in the latter i.e. </a:t>
+                  <a:t> directly contributes to one’s wealth and the excess </a:t>
                 </a:r>
                 <a14:m>
                   <m:oMath xmlns:m="http://schemas.openxmlformats.org/officeDocument/2006/math">
@@ -4295,13 +4324,21 @@
                 </a14:m>
                 <a:r>
                   <a:rPr lang="en-US" dirty="0"/>
-                  <a:t>enables a competition with someone richer than the consumer</a:t>
+                  <a:t>enables a competition with someone richer than the consumer. Both </a:t>
                 </a:r>
-              </a:p>
-              <a:p>
+                <a14:m>
+                  <m:oMath xmlns:m="http://schemas.openxmlformats.org/officeDocument/2006/math">
+                    <m:r>
+                      <a:rPr lang="en-US" i="1">
+                        <a:latin typeface="Cambria Math" panose="02040503050406030204" pitchFamily="18" charset="0"/>
+                      </a:rPr>
+                      <m:t>𝐴</m:t>
+                    </m:r>
+                  </m:oMath>
+                </a14:m>
                 <a:r>
                   <a:rPr lang="en-US" dirty="0"/>
-                  <a:t>As we have argued before, the utility from </a:t>
+                  <a:t> and </a:t>
                 </a:r>
                 <a14:m>
                   <m:oMath xmlns:m="http://schemas.openxmlformats.org/officeDocument/2006/math">
@@ -4321,13 +4358,17 @@
                 </a14:m>
                 <a:r>
                   <a:rPr lang="en-US" dirty="0"/>
-                  <a:t>is not deterministic. Further, the asset bands which a consumer is viewed as a part of cannot be assumed to be static over time. </a:t>
+                  <a:t>contribute to status as if they were two substitutable goods</a:t>
                 </a:r>
               </a:p>
               <a:p>
+                <a:pPr marL="914400" lvl="1" indent="-457200">
+                  <a:buFont typeface="+mj-lt"/>
+                  <a:buAutoNum type="arabicPeriod"/>
+                </a:pPr>
                 <a:r>
                   <a:rPr lang="en-US" dirty="0"/>
-                  <a:t>We thus explore the notion of competition using </a:t>
+                  <a:t>A temporal hierarchy of needs is discussed where needs are predetermined, </a:t>
                 </a:r>
                 <a14:m>
                   <m:oMath xmlns:m="http://schemas.openxmlformats.org/officeDocument/2006/math">
@@ -4341,7 +4382,81 @@
                 </a14:m>
                 <a:r>
                   <a:rPr lang="en-US" dirty="0"/>
-                  <a:t> and </a:t>
+                  <a:t> corresponds to long-term needs and </a:t>
+                </a:r>
+                <a14:m>
+                  <m:oMath xmlns:m="http://schemas.openxmlformats.org/officeDocument/2006/math">
+                    <m:r>
+                      <a:rPr lang="en-US" i="1">
+                        <a:latin typeface="Cambria Math" panose="02040503050406030204" pitchFamily="18" charset="0"/>
+                      </a:rPr>
+                      <m:t>𝜈</m:t>
+                    </m:r>
+                  </m:oMath>
+                </a14:m>
+                <a:r>
+                  <a:rPr lang="en-US" dirty="0"/>
+                  <a:t> represents the immediate demand for excess. </a:t>
+                </a:r>
+              </a:p>
+              <a:p>
+                <a:r>
+                  <a:rPr lang="en-US" dirty="0"/>
+                  <a:t>In the current chapter, we consider that the utility from </a:t>
+                </a:r>
+                <a14:m>
+                  <m:oMath xmlns:m="http://schemas.openxmlformats.org/officeDocument/2006/math">
+                    <m:r>
+                      <a:rPr lang="en-US" i="1">
+                        <a:latin typeface="Cambria Math" panose="02040503050406030204" pitchFamily="18" charset="0"/>
+                      </a:rPr>
+                      <m:t>𝜈</m:t>
+                    </m:r>
+                    <m:r>
+                      <a:rPr lang="en-US" i="1">
+                        <a:latin typeface="Cambria Math" panose="02040503050406030204" pitchFamily="18" charset="0"/>
+                      </a:rPr>
+                      <m:t> </m:t>
+                    </m:r>
+                  </m:oMath>
+                </a14:m>
+                <a:r>
+                  <a:rPr lang="en-US" dirty="0"/>
+                  <a:t>is not deterministic (the asset bands that a consumer belongs to in the </a:t>
+                </a:r>
+                <a14:m>
+                  <m:oMath xmlns:m="http://schemas.openxmlformats.org/officeDocument/2006/math">
+                    <m:r>
+                      <a:rPr lang="en-US" i="1">
+                        <a:latin typeface="Cambria Math" panose="02040503050406030204" pitchFamily="18" charset="0"/>
+                      </a:rPr>
+                      <m:t>𝐴</m:t>
+                    </m:r>
+                    <m:r>
+                      <a:rPr lang="en-US" i="1">
+                        <a:latin typeface="Cambria Math" panose="02040503050406030204" pitchFamily="18" charset="0"/>
+                      </a:rPr>
+                      <m:t> </m:t>
+                    </m:r>
+                  </m:oMath>
+                </a14:m>
+                <a:r>
+                  <a:rPr lang="en-US" dirty="0"/>
+                  <a:t>-</a:t>
+                </a:r>
+                <a14:m>
+                  <m:oMath xmlns:m="http://schemas.openxmlformats.org/officeDocument/2006/math">
+                    <m:r>
+                      <a:rPr lang="en-US" i="1">
+                        <a:latin typeface="Cambria Math" panose="02040503050406030204" pitchFamily="18" charset="0"/>
+                      </a:rPr>
+                      <m:t>𝜈</m:t>
+                    </m:r>
+                  </m:oMath>
+                </a14:m>
+                <a:r>
+                  <a:rPr lang="en-US" dirty="0"/>
+                  <a:t> substitution are not static over time). We thus associate </a:t>
                 </a:r>
                 <a14:m>
                   <m:oMath xmlns:m="http://schemas.openxmlformats.org/officeDocument/2006/math">
@@ -4361,7 +4476,31 @@
                 </a14:m>
                 <a:r>
                   <a:rPr lang="en-US" dirty="0"/>
-                  <a:t>where the choice </a:t>
+                  <a:t> with the probability the consumer assigns to a future wealth goal </a:t>
+                </a:r>
+              </a:p>
+              <a:p>
+                <a:pPr marL="914400" lvl="1" indent="-457200">
+                  <a:buFont typeface="+mj-lt"/>
+                  <a:buAutoNum type="arabicPeriod"/>
+                </a:pPr>
+                <a:r>
+                  <a:rPr lang="en-US" dirty="0"/>
+                  <a:t>The consumers therefore only compete for </a:t>
+                </a:r>
+                <a14:m>
+                  <m:oMath xmlns:m="http://schemas.openxmlformats.org/officeDocument/2006/math">
+                    <m:r>
+                      <a:rPr lang="en-US" i="1">
+                        <a:latin typeface="Cambria Math" panose="02040503050406030204" pitchFamily="18" charset="0"/>
+                      </a:rPr>
+                      <m:t>𝐴</m:t>
+                    </m:r>
+                  </m:oMath>
+                </a14:m>
+                <a:r>
+                  <a:rPr lang="en-US" dirty="0"/>
+                  <a:t> while controlling the amount of risk they are willing to take towards future wealth - with </a:t>
                 </a:r>
                 <a14:m>
                   <m:oMath xmlns:m="http://schemas.openxmlformats.org/officeDocument/2006/math">
@@ -4371,29 +4510,84 @@
                       </a:rPr>
                       <m:t>𝜈</m:t>
                     </m:r>
+                  </m:oMath>
+                </a14:m>
+                <a:r>
+                  <a:rPr lang="en-US" dirty="0"/>
+                  <a:t> </a:t>
+                </a:r>
+              </a:p>
+              <a:p>
+                <a:pPr marL="914400" lvl="1" indent="-457200">
+                  <a:buFont typeface="+mj-lt"/>
+                  <a:buAutoNum type="arabicPeriod"/>
+                </a:pPr>
+                <a:r>
+                  <a:rPr lang="en-US" dirty="0"/>
+                  <a:t>The hierarchy of needs is based on certainty rather than temporality – i.e. needs are known with more certainty than </a:t>
+                </a:r>
+                <a14:m>
+                  <m:oMath xmlns:m="http://schemas.openxmlformats.org/officeDocument/2006/math">
                     <m:r>
                       <a:rPr lang="en-US" i="1">
                         <a:latin typeface="Cambria Math" panose="02040503050406030204" pitchFamily="18" charset="0"/>
                       </a:rPr>
-                      <m:t> </m:t>
+                      <m:t>𝐴</m:t>
                     </m:r>
                   </m:oMath>
                 </a14:m>
                 <a:r>
                   <a:rPr lang="en-US" dirty="0"/>
-                  <a:t>is associated with the future wealth goal and a subjective probability</a:t>
+                  <a:t> and decision for </a:t>
+                </a:r>
+                <a14:m>
+                  <m:oMath xmlns:m="http://schemas.openxmlformats.org/officeDocument/2006/math">
+                    <m:r>
+                      <a:rPr lang="en-US" i="1">
+                        <a:latin typeface="Cambria Math" panose="02040503050406030204" pitchFamily="18" charset="0"/>
+                      </a:rPr>
+                      <m:t>𝜈</m:t>
+                    </m:r>
+                  </m:oMath>
+                </a14:m>
+                <a:r>
+                  <a:rPr lang="en-US" dirty="0"/>
+                  <a:t> is based on subjective evaluation of future </a:t>
+                </a:r>
+                <a14:m>
+                  <m:oMath xmlns:m="http://schemas.openxmlformats.org/officeDocument/2006/math">
+                    <m:r>
+                      <a:rPr lang="en-US" i="1">
+                        <a:latin typeface="Cambria Math" panose="02040503050406030204" pitchFamily="18" charset="0"/>
+                      </a:rPr>
+                      <m:t>𝐴</m:t>
+                    </m:r>
+                  </m:oMath>
+                </a14:m>
+                <a:r>
+                  <a:rPr lang="en-US" dirty="0"/>
+                  <a:t> (which are known with more certainty than </a:t>
+                </a:r>
+                <a14:m>
+                  <m:oMath xmlns:m="http://schemas.openxmlformats.org/officeDocument/2006/math">
+                    <m:r>
+                      <a:rPr lang="en-US" i="1">
+                        <a:latin typeface="Cambria Math" panose="02040503050406030204" pitchFamily="18" charset="0"/>
+                      </a:rPr>
+                      <m:t>𝜈</m:t>
+                    </m:r>
+                  </m:oMath>
+                </a14:m>
+                <a:r>
+                  <a:rPr lang="en-US" dirty="0"/>
+                  <a:t>). The consumer is less uncertain about her needs than she is about future wealth or the degree of protection she wishes to seek.  </a:t>
                 </a:r>
               </a:p>
               <a:p>
                 <a:r>
                   <a:rPr lang="en-US" dirty="0"/>
-                  <a:t>In this stochastic setting for growth of wealth, we therefore seek the minimum conditions required </a:t>
+                  <a:t>In the stochastic setting for growth of wealth, we seek the minimum conditions required for status consumption</a:t>
                 </a:r>
-                <a:r>
-                  <a:rPr lang="en-US"/>
-                  <a:t>for status consumption</a:t>
-                </a:r>
-                <a:endParaRPr lang="en-US" dirty="0"/>
               </a:p>
               <a:p>
                 <a:endParaRPr lang="en-GB" dirty="0"/>
@@ -4422,10 +4616,14 @@
               </p:nvPr>
             </p:nvSpPr>
             <p:spPr>
+              <a:xfrm>
+                <a:off x="846589" y="1825625"/>
+                <a:ext cx="10515600" cy="4351338"/>
+              </a:xfrm>
               <a:blipFill>
                 <a:blip r:embed="rId2"/>
                 <a:stretch>
-                  <a:fillRect l="-928" t="-2801" r="-1565" b="-2241"/>
+                  <a:fillRect l="-522" t="-2521"/>
                 </a:stretch>
               </a:blipFill>
             </p:spPr>

</xml_diff>